<commit_message>
Changed About message to reflect FileHarvestGUI, not neoVEOGUI
</commit_message>
<xml_diff>
--- a/FileHarvest ajw 20180612-1.pptx
+++ b/FileHarvest ajw 20180612-1.pptx
@@ -282,7 +282,7 @@
               <a:pPr>
                 <a:defRPr/>
               </a:pPr>
-              <a:t>21/06/2018</a:t>
+              <a:t>26/06/2018</a:t>
             </a:fld>
             <a:endParaRPr lang="en-AU" dirty="0"/>
           </a:p>
@@ -504,7 +504,7 @@
               <a:pPr>
                 <a:defRPr/>
               </a:pPr>
-              <a:t>21/06/2018</a:t>
+              <a:t>26/06/2018</a:t>
             </a:fld>
             <a:endParaRPr lang="en-AU" dirty="0"/>
           </a:p>
@@ -3036,32 +3036,6 @@
           </a:prstGeom>
         </p:spPr>
       </p:pic>
-      <p:sp>
-        <p:nvSpPr>
-          <p:cNvPr id="6" name="Content Placeholder 5">
-            <a:extLst>
-              <a:ext uri="{FF2B5EF4-FFF2-40B4-BE49-F238E27FC236}">
-                <a16:creationId xmlns:a16="http://schemas.microsoft.com/office/drawing/2014/main" id="{DA85D8AB-D59C-414A-82DD-98AB072CE3B6}"/>
-              </a:ext>
-            </a:extLst>
-          </p:cNvPr>
-          <p:cNvSpPr>
-            <a:spLocks noGrp="1"/>
-          </p:cNvSpPr>
-          <p:nvPr>
-            <p:ph idx="1"/>
-          </p:nvPr>
-        </p:nvSpPr>
-        <p:spPr/>
-        <p:txBody>
-          <a:bodyPr/>
-          <a:lstStyle/>
-          <a:p>
-            <a:pPr lvl="0"/>
-            <a:endParaRPr lang="en-AU" dirty="0"/>
-          </a:p>
-        </p:txBody>
-      </p:sp>
     </p:spTree>
     <p:extLst>
       <p:ext uri="{BB962C8B-B14F-4D97-AF65-F5344CB8AC3E}">

</xml_diff>